<commit_message>
Sendt til vejleder 23-5
</commit_message>
<xml_diff>
--- a/rapport/images/ballflowchart.pptx
+++ b/rapport/images/ballflowchart.pptx
@@ -192,7 +192,7 @@
           <a:p>
             <a:fld id="{979FE2CB-B9B9-E740-92E1-82EBC6D5EB1E}" type="datetimeFigureOut">
               <a:rPr lang="en-US" smtClean="0"/>
-              <a:t>09/05/11</a:t>
+              <a:t>23/05/11</a:t>
             </a:fld>
             <a:endParaRPr lang="en-US"/>
           </a:p>
@@ -641,7 +641,7 @@
           <a:p>
             <a:fld id="{598C5745-916F-AD46-B38B-90BCDE7060F7}" type="datetimeFigureOut">
               <a:rPr lang="en-US" smtClean="0"/>
-              <a:t>09/05/11</a:t>
+              <a:t>23/05/11</a:t>
             </a:fld>
             <a:endParaRPr lang="en-US"/>
           </a:p>
@@ -811,7 +811,7 @@
           <a:p>
             <a:fld id="{598C5745-916F-AD46-B38B-90BCDE7060F7}" type="datetimeFigureOut">
               <a:rPr lang="en-US" smtClean="0"/>
-              <a:t>09/05/11</a:t>
+              <a:t>23/05/11</a:t>
             </a:fld>
             <a:endParaRPr lang="en-US"/>
           </a:p>
@@ -991,7 +991,7 @@
           <a:p>
             <a:fld id="{598C5745-916F-AD46-B38B-90BCDE7060F7}" type="datetimeFigureOut">
               <a:rPr lang="en-US" smtClean="0"/>
-              <a:t>09/05/11</a:t>
+              <a:t>23/05/11</a:t>
             </a:fld>
             <a:endParaRPr lang="en-US"/>
           </a:p>
@@ -1161,7 +1161,7 @@
           <a:p>
             <a:fld id="{598C5745-916F-AD46-B38B-90BCDE7060F7}" type="datetimeFigureOut">
               <a:rPr lang="en-US" smtClean="0"/>
-              <a:t>09/05/11</a:t>
+              <a:t>23/05/11</a:t>
             </a:fld>
             <a:endParaRPr lang="en-US"/>
           </a:p>
@@ -1407,7 +1407,7 @@
           <a:p>
             <a:fld id="{598C5745-916F-AD46-B38B-90BCDE7060F7}" type="datetimeFigureOut">
               <a:rPr lang="en-US" smtClean="0"/>
-              <a:t>09/05/11</a:t>
+              <a:t>23/05/11</a:t>
             </a:fld>
             <a:endParaRPr lang="en-US"/>
           </a:p>
@@ -1695,7 +1695,7 @@
           <a:p>
             <a:fld id="{598C5745-916F-AD46-B38B-90BCDE7060F7}" type="datetimeFigureOut">
               <a:rPr lang="en-US" smtClean="0"/>
-              <a:t>09/05/11</a:t>
+              <a:t>23/05/11</a:t>
             </a:fld>
             <a:endParaRPr lang="en-US"/>
           </a:p>
@@ -2117,7 +2117,7 @@
           <a:p>
             <a:fld id="{598C5745-916F-AD46-B38B-90BCDE7060F7}" type="datetimeFigureOut">
               <a:rPr lang="en-US" smtClean="0"/>
-              <a:t>09/05/11</a:t>
+              <a:t>23/05/11</a:t>
             </a:fld>
             <a:endParaRPr lang="en-US"/>
           </a:p>
@@ -2235,7 +2235,7 @@
           <a:p>
             <a:fld id="{598C5745-916F-AD46-B38B-90BCDE7060F7}" type="datetimeFigureOut">
               <a:rPr lang="en-US" smtClean="0"/>
-              <a:t>09/05/11</a:t>
+              <a:t>23/05/11</a:t>
             </a:fld>
             <a:endParaRPr lang="en-US"/>
           </a:p>
@@ -2330,7 +2330,7 @@
           <a:p>
             <a:fld id="{598C5745-916F-AD46-B38B-90BCDE7060F7}" type="datetimeFigureOut">
               <a:rPr lang="en-US" smtClean="0"/>
-              <a:t>09/05/11</a:t>
+              <a:t>23/05/11</a:t>
             </a:fld>
             <a:endParaRPr lang="en-US"/>
           </a:p>
@@ -2607,7 +2607,7 @@
           <a:p>
             <a:fld id="{598C5745-916F-AD46-B38B-90BCDE7060F7}" type="datetimeFigureOut">
               <a:rPr lang="en-US" smtClean="0"/>
-              <a:t>09/05/11</a:t>
+              <a:t>23/05/11</a:t>
             </a:fld>
             <a:endParaRPr lang="en-US"/>
           </a:p>
@@ -2860,7 +2860,7 @@
           <a:p>
             <a:fld id="{598C5745-916F-AD46-B38B-90BCDE7060F7}" type="datetimeFigureOut">
               <a:rPr lang="en-US" smtClean="0"/>
-              <a:t>09/05/11</a:t>
+              <a:t>23/05/11</a:t>
             </a:fld>
             <a:endParaRPr lang="en-US"/>
           </a:p>
@@ -3073,7 +3073,7 @@
           <a:p>
             <a:fld id="{598C5745-916F-AD46-B38B-90BCDE7060F7}" type="datetimeFigureOut">
               <a:rPr lang="en-US" smtClean="0"/>
-              <a:t>09/05/11</a:t>
+              <a:t>23/05/11</a:t>
             </a:fld>
             <a:endParaRPr lang="en-US"/>
           </a:p>
@@ -3450,21 +3450,23 @@
       </p:grpSpPr>
       <p:cxnSp>
         <p:nvCxnSpPr>
-          <p:cNvPr id="221" name="Elbow Connector 220"/>
+          <p:cNvPr id="28" name="Straight Arrow Connector 27"/>
           <p:cNvCxnSpPr>
-            <a:stCxn id="115" idx="2"/>
+            <a:stCxn id="184" idx="2"/>
           </p:cNvCxnSpPr>
           <p:nvPr/>
         </p:nvCxnSpPr>
         <p:spPr>
-          <a:xfrm rot="5400000">
-            <a:off x="7475543" y="1905027"/>
-            <a:ext cx="299816" cy="1860821"/>
-          </a:xfrm>
-          <a:prstGeom prst="bentConnector2">
+          <a:xfrm>
+            <a:off x="6628996" y="4996150"/>
+            <a:ext cx="0" cy="280700"/>
+          </a:xfrm>
+          <a:prstGeom prst="straightConnector1">
             <a:avLst/>
           </a:prstGeom>
-          <a:effectLst/>
+          <a:ln>
+            <a:tailEnd type="arrow"/>
+          </a:ln>
         </p:spPr>
         <p:style>
           <a:lnRef idx="2">
@@ -3489,7 +3491,7 @@
         </p:nvSpPr>
         <p:spPr>
           <a:xfrm>
-            <a:off x="2968102" y="1903235"/>
+            <a:off x="3082402" y="1903235"/>
             <a:ext cx="1143700" cy="854302"/>
           </a:xfrm>
           <a:prstGeom prst="flowChartProcess">
@@ -3531,7 +3533,7 @@
         </p:nvSpPr>
         <p:spPr>
           <a:xfrm>
-            <a:off x="4427316" y="1961231"/>
+            <a:off x="4554316" y="1961231"/>
             <a:ext cx="917049" cy="710286"/>
           </a:xfrm>
           <a:prstGeom prst="flowChartProcess">
@@ -3576,8 +3578,8 @@
         </p:nvCxnSpPr>
         <p:spPr>
           <a:xfrm>
-            <a:off x="5344365" y="2316374"/>
-            <a:ext cx="463263" cy="2429"/>
+            <a:off x="5471365" y="2316374"/>
+            <a:ext cx="281255" cy="2429"/>
           </a:xfrm>
           <a:prstGeom prst="bentConnector3">
             <a:avLst>
@@ -3615,7 +3617,7 @@
         <p:spPr>
           <a:xfrm>
             <a:off x="7582451" y="2318803"/>
-            <a:ext cx="432048" cy="11583"/>
+            <a:ext cx="406648" cy="11583"/>
           </a:xfrm>
           <a:prstGeom prst="straightConnector1">
             <a:avLst/>
@@ -3694,8 +3696,8 @@
         </p:nvSpPr>
         <p:spPr>
           <a:xfrm>
-            <a:off x="5807628" y="1856490"/>
-            <a:ext cx="1774823" cy="924626"/>
+            <a:off x="5752620" y="1856490"/>
+            <a:ext cx="1829831" cy="924626"/>
           </a:xfrm>
           <a:prstGeom prst="flowChartDecision">
             <a:avLst/>
@@ -3739,8 +3741,8 @@
         </p:nvCxnSpPr>
         <p:spPr>
           <a:xfrm flipV="1">
-            <a:off x="4111802" y="2316374"/>
-            <a:ext cx="315514" cy="14012"/>
+            <a:off x="4226102" y="2316374"/>
+            <a:ext cx="328214" cy="14012"/>
           </a:xfrm>
           <a:prstGeom prst="straightConnector1">
             <a:avLst/>
@@ -3772,7 +3774,7 @@
         </p:nvSpPr>
         <p:spPr>
           <a:xfrm>
-            <a:off x="8014499" y="1975243"/>
+            <a:off x="7989099" y="1975243"/>
             <a:ext cx="1082724" cy="710286"/>
           </a:xfrm>
           <a:prstGeom prst="flowChartProcess">
@@ -3800,7 +3802,11 @@
             <a:pPr algn="ctr"/>
             <a:r>
               <a:rPr lang="en-US" sz="1200" dirty="0" smtClean="0"/>
-              <a:t>Save ball in list</a:t>
+              <a:t>Save ball in </a:t>
+            </a:r>
+            <a:r>
+              <a:rPr lang="en-US" sz="1200" dirty="0" smtClean="0"/>
+              <a:t>candidate list</a:t>
             </a:r>
             <a:endParaRPr lang="en-US" sz="1200" dirty="0"/>
           </a:p>
@@ -3810,19 +3816,19 @@
         <p:nvCxnSpPr>
           <p:cNvPr id="130" name="Elbow Connector 129"/>
           <p:cNvCxnSpPr>
-            <a:stCxn id="66" idx="2"/>
+            <a:stCxn id="115" idx="2"/>
             <a:endCxn id="132" idx="2"/>
           </p:cNvCxnSpPr>
           <p:nvPr/>
         </p:nvCxnSpPr>
         <p:spPr>
           <a:xfrm rot="5400000" flipH="1">
-            <a:off x="4233535" y="319611"/>
-            <a:ext cx="144406" cy="4778604"/>
+            <a:off x="5313339" y="-531592"/>
+            <a:ext cx="48819" cy="6385425"/>
           </a:xfrm>
           <a:prstGeom prst="bentConnector3">
             <a:avLst>
-              <a:gd name="adj1" fmla="val -145177"/>
+              <a:gd name="adj1" fmla="val -468260"/>
             </a:avLst>
           </a:prstGeom>
           <a:ln>
@@ -3852,7 +3858,7 @@
         </p:nvSpPr>
         <p:spPr>
           <a:xfrm>
-            <a:off x="1259112" y="2024062"/>
+            <a:off x="1487712" y="2024062"/>
             <a:ext cx="1314648" cy="612648"/>
           </a:xfrm>
           <a:prstGeom prst="flowChartDecision">
@@ -3897,8 +3903,8 @@
         </p:nvCxnSpPr>
         <p:spPr>
           <a:xfrm>
-            <a:off x="2573760" y="2330386"/>
-            <a:ext cx="394342" cy="0"/>
+            <a:off x="2802360" y="2330386"/>
+            <a:ext cx="280042" cy="0"/>
           </a:xfrm>
           <a:prstGeom prst="straightConnector1">
             <a:avLst/>
@@ -3933,8 +3939,8 @@
         </p:nvCxnSpPr>
         <p:spPr>
           <a:xfrm rot="5400000">
-            <a:off x="1537431" y="1645055"/>
-            <a:ext cx="758013" cy="1"/>
+            <a:off x="1986153" y="1865177"/>
+            <a:ext cx="317769" cy="1"/>
           </a:xfrm>
           <a:prstGeom prst="bentConnector3">
             <a:avLst>
@@ -3968,7 +3974,7 @@
         </p:nvSpPr>
         <p:spPr>
           <a:xfrm>
-            <a:off x="2516277" y="2072070"/>
+            <a:off x="2706777" y="2033970"/>
             <a:ext cx="601678" cy="276999"/>
           </a:xfrm>
           <a:prstGeom prst="rect">
@@ -4015,7 +4021,7 @@
         </p:nvSpPr>
         <p:spPr>
           <a:xfrm>
-            <a:off x="4276488" y="3701879"/>
+            <a:off x="4276488" y="4155277"/>
             <a:ext cx="1069883" cy="710286"/>
           </a:xfrm>
           <a:prstGeom prst="flowChartProcess">
@@ -4057,8 +4063,8 @@
         </p:nvSpPr>
         <p:spPr>
           <a:xfrm>
-            <a:off x="2111952" y="3647826"/>
-            <a:ext cx="1835055" cy="819148"/>
+            <a:off x="2219132" y="3971886"/>
+            <a:ext cx="1727875" cy="1074234"/>
           </a:xfrm>
           <a:prstGeom prst="flowChartDecision">
             <a:avLst/>
@@ -4085,7 +4091,22 @@
             <a:pPr algn="ctr"/>
             <a:r>
               <a:rPr lang="en-US" sz="1200" dirty="0" smtClean="0"/>
-              <a:t>End of list / n</a:t>
+              <a:t>End of list </a:t>
+            </a:r>
+            <a:r>
+              <a:rPr lang="en-US" sz="1200" dirty="0" smtClean="0"/>
+              <a:t>or</a:t>
+            </a:r>
+            <a:r>
+              <a:rPr lang="en-US" sz="1200" dirty="0" smtClean="0"/>
+              <a:t> </a:t>
+            </a:r>
+          </a:p>
+          <a:p>
+            <a:pPr algn="ctr"/>
+            <a:r>
+              <a:rPr lang="en-US" sz="1200" dirty="0" smtClean="0"/>
+              <a:t>n</a:t>
             </a:r>
             <a:r>
               <a:rPr lang="en-US" sz="1200" baseline="-25000" dirty="0" smtClean="0"/>
@@ -4093,9 +4114,12 @@
             </a:r>
             <a:r>
               <a:rPr lang="en-US" sz="1200" dirty="0" smtClean="0"/>
-              <a:t>= 16 ?</a:t>
-            </a:r>
-            <a:endParaRPr lang="en-US" sz="1200" dirty="0"/>
+              <a:t>= 16 </a:t>
+            </a:r>
+            <a:r>
+              <a:rPr lang="en-US" sz="1200" dirty="0" smtClean="0"/>
+              <a:t>?</a:t>
+            </a:r>
           </a:p>
         </p:txBody>
       </p:sp>
@@ -4104,19 +4128,18 @@
           <p:cNvPr id="165" name="Elbow Connector 164"/>
           <p:cNvCxnSpPr>
             <a:stCxn id="132" idx="1"/>
-            <a:endCxn id="164" idx="0"/>
+            <a:endCxn id="8" idx="2"/>
           </p:cNvCxnSpPr>
           <p:nvPr/>
         </p:nvCxnSpPr>
         <p:spPr>
           <a:xfrm rot="10800000" flipH="1" flipV="1">
-            <a:off x="1259112" y="2330386"/>
-            <a:ext cx="1770368" cy="1317440"/>
-          </a:xfrm>
-          <a:prstGeom prst="bentConnector4">
+            <a:off x="1487711" y="2330386"/>
+            <a:ext cx="83385" cy="1329910"/>
+          </a:xfrm>
+          <a:prstGeom prst="bentConnector3">
             <a:avLst>
-              <a:gd name="adj1" fmla="val -12913"/>
-              <a:gd name="adj2" fmla="val 75765"/>
+              <a:gd name="adj1" fmla="val -165312"/>
             </a:avLst>
           </a:prstGeom>
           <a:ln>
@@ -4146,7 +4169,7 @@
         </p:nvSpPr>
         <p:spPr>
           <a:xfrm>
-            <a:off x="958273" y="2030885"/>
+            <a:off x="1224973" y="2043585"/>
             <a:ext cx="601678" cy="276999"/>
           </a:xfrm>
           <a:prstGeom prst="rect">
@@ -4195,9 +4218,9 @@
           <p:nvPr/>
         </p:nvCxnSpPr>
         <p:spPr>
-          <a:xfrm flipV="1">
-            <a:off x="3947007" y="4057022"/>
-            <a:ext cx="329481" cy="378"/>
+          <a:xfrm>
+            <a:off x="3947007" y="4509003"/>
+            <a:ext cx="329481" cy="1417"/>
           </a:xfrm>
           <a:prstGeom prst="bentConnector3">
             <a:avLst>
@@ -4231,7 +4254,7 @@
         </p:nvSpPr>
         <p:spPr>
           <a:xfrm>
-            <a:off x="5752620" y="3572047"/>
+            <a:off x="5752620" y="4025445"/>
             <a:ext cx="1752752" cy="970705"/>
           </a:xfrm>
           <a:prstGeom prst="flowChartDecision">
@@ -4276,7 +4299,7 @@
         </p:nvCxnSpPr>
         <p:spPr>
           <a:xfrm>
-            <a:off x="5346371" y="4057022"/>
+            <a:off x="5346371" y="4510420"/>
             <a:ext cx="406249" cy="378"/>
           </a:xfrm>
           <a:prstGeom prst="bentConnector3">
@@ -4311,7 +4334,7 @@
         </p:nvSpPr>
         <p:spPr>
           <a:xfrm>
-            <a:off x="8038840" y="3701879"/>
+            <a:off x="7911840" y="4155277"/>
             <a:ext cx="1069883" cy="710664"/>
           </a:xfrm>
           <a:prstGeom prst="flowChartProcess">
@@ -4356,8 +4379,8 @@
         </p:nvCxnSpPr>
         <p:spPr>
           <a:xfrm flipV="1">
-            <a:off x="7505372" y="4057211"/>
-            <a:ext cx="533468" cy="189"/>
+            <a:off x="7505372" y="4510609"/>
+            <a:ext cx="406468" cy="189"/>
           </a:xfrm>
           <a:prstGeom prst="bentConnector3">
             <a:avLst>
@@ -4391,7 +4414,7 @@
         </p:nvSpPr>
         <p:spPr>
           <a:xfrm>
-            <a:off x="7505372" y="3822038"/>
+            <a:off x="7479972" y="4275436"/>
             <a:ext cx="601678" cy="276999"/>
           </a:xfrm>
           <a:prstGeom prst="rect">
@@ -4434,19 +4457,19 @@
         <p:nvCxnSpPr>
           <p:cNvPr id="203" name="Elbow Connector 202"/>
           <p:cNvCxnSpPr>
-            <a:stCxn id="184" idx="2"/>
+            <a:stCxn id="192" idx="2"/>
             <a:endCxn id="164" idx="2"/>
           </p:cNvCxnSpPr>
           <p:nvPr/>
         </p:nvCxnSpPr>
         <p:spPr>
-          <a:xfrm rot="5400000" flipH="1">
-            <a:off x="4791349" y="2705105"/>
-            <a:ext cx="75778" cy="3599516"/>
+          <a:xfrm rot="5400000">
+            <a:off x="5674837" y="2274174"/>
+            <a:ext cx="180179" cy="5363712"/>
           </a:xfrm>
           <a:prstGeom prst="bentConnector3">
             <a:avLst>
-              <a:gd name="adj1" fmla="val -301671"/>
+              <a:gd name="adj1" fmla="val 226874"/>
             </a:avLst>
           </a:prstGeom>
           <a:ln>
@@ -4478,9 +4501,9 @@
           <p:nvPr/>
         </p:nvCxnSpPr>
         <p:spPr>
-          <a:xfrm rot="10800000">
-            <a:off x="1836454" y="4057022"/>
-            <a:ext cx="275499" cy="378"/>
+          <a:xfrm rot="10800000" flipV="1">
+            <a:off x="1836454" y="4509002"/>
+            <a:ext cx="382679" cy="1417"/>
           </a:xfrm>
           <a:prstGeom prst="bentConnector3">
             <a:avLst>
@@ -4514,7 +4537,7 @@
         </p:nvSpPr>
         <p:spPr>
           <a:xfrm>
-            <a:off x="936701" y="3787782"/>
+            <a:off x="936701" y="4241180"/>
             <a:ext cx="899752" cy="538480"/>
           </a:xfrm>
           <a:prstGeom prst="flowChartAlternateProcess">
@@ -4556,7 +4579,7 @@
         </p:nvSpPr>
         <p:spPr>
           <a:xfrm>
-            <a:off x="1367303" y="727569"/>
+            <a:off x="1595903" y="1167813"/>
             <a:ext cx="1098267" cy="538480"/>
           </a:xfrm>
           <a:prstGeom prst="flowChartAlternateProcess">
@@ -4598,7 +4621,7 @@
         </p:nvSpPr>
         <p:spPr>
           <a:xfrm>
-            <a:off x="1836453" y="3780023"/>
+            <a:off x="1836872" y="4232003"/>
             <a:ext cx="601678" cy="276999"/>
           </a:xfrm>
           <a:prstGeom prst="rect">
@@ -4645,7 +4668,7 @@
         </p:nvSpPr>
         <p:spPr>
           <a:xfrm>
-            <a:off x="3911804" y="3780023"/>
+            <a:off x="3911804" y="4233421"/>
             <a:ext cx="601678" cy="276999"/>
           </a:xfrm>
           <a:prstGeom prst="rect">
@@ -4684,39 +4707,6 @@
           </a:p>
         </p:txBody>
       </p:sp>
-      <p:cxnSp>
-        <p:nvCxnSpPr>
-          <p:cNvPr id="255" name="Elbow Connector 254"/>
-          <p:cNvCxnSpPr>
-            <a:stCxn id="192" idx="2"/>
-          </p:cNvCxnSpPr>
-          <p:nvPr/>
-        </p:nvCxnSpPr>
-        <p:spPr>
-          <a:xfrm rot="5400000">
-            <a:off x="7423115" y="3618424"/>
-            <a:ext cx="356549" cy="1944786"/>
-          </a:xfrm>
-          <a:prstGeom prst="bentConnector2">
-            <a:avLst/>
-          </a:prstGeom>
-          <a:effectLst/>
-        </p:spPr>
-        <p:style>
-          <a:lnRef idx="2">
-            <a:schemeClr val="accent1"/>
-          </a:lnRef>
-          <a:fillRef idx="0">
-            <a:schemeClr val="accent1"/>
-          </a:fillRef>
-          <a:effectRef idx="1">
-            <a:schemeClr val="accent1"/>
-          </a:effectRef>
-          <a:fontRef idx="minor">
-            <a:schemeClr val="tx1"/>
-          </a:fontRef>
-        </p:style>
-      </p:cxnSp>
       <p:sp>
         <p:nvSpPr>
           <p:cNvPr id="269" name="TextBox 268"/>
@@ -4772,8 +4762,8 @@
         </p:nvSpPr>
         <p:spPr>
           <a:xfrm>
-            <a:off x="6581960" y="4445061"/>
-            <a:ext cx="601678" cy="276999"/>
+            <a:off x="6671522" y="4898459"/>
+            <a:ext cx="512116" cy="276999"/>
           </a:xfrm>
           <a:prstGeom prst="rect">
             <a:avLst/>
@@ -4808,6 +4798,235 @@
               <a:t>Yes</a:t>
             </a:r>
             <a:endParaRPr lang="en-US" sz="1200" dirty="0"/>
+          </a:p>
+        </p:txBody>
+      </p:sp>
+      <p:sp>
+        <p:nvSpPr>
+          <p:cNvPr id="8" name="Data 7"/>
+          <p:cNvSpPr/>
+          <p:nvPr/>
+        </p:nvSpPr>
+        <p:spPr>
+          <a:xfrm>
+            <a:off x="1426067" y="3369621"/>
+            <a:ext cx="1450304" cy="581349"/>
+          </a:xfrm>
+          <a:prstGeom prst="flowChartInputOutput">
+            <a:avLst/>
+          </a:prstGeom>
+        </p:spPr>
+        <p:style>
+          <a:lnRef idx="2">
+            <a:schemeClr val="accent1"/>
+          </a:lnRef>
+          <a:fillRef idx="1">
+            <a:schemeClr val="lt1"/>
+          </a:fillRef>
+          <a:effectRef idx="0">
+            <a:schemeClr val="accent1"/>
+          </a:effectRef>
+          <a:fontRef idx="minor">
+            <a:schemeClr val="dk1"/>
+          </a:fontRef>
+        </p:style>
+        <p:txBody>
+          <a:bodyPr rtlCol="0" anchor="ctr"/>
+          <a:lstStyle/>
+          <a:p>
+            <a:pPr algn="ctr"/>
+            <a:r>
+              <a:rPr lang="en-US" sz="1200" dirty="0" smtClean="0"/>
+              <a:t>List of ball </a:t>
+            </a:r>
+            <a:r>
+              <a:rPr lang="en-US" sz="1200" dirty="0"/>
+              <a:t>c</a:t>
+            </a:r>
+            <a:r>
+              <a:rPr lang="en-US" sz="1200" dirty="0" smtClean="0"/>
+              <a:t>andidates</a:t>
+            </a:r>
+            <a:endParaRPr lang="en-US" sz="1200" dirty="0"/>
+          </a:p>
+        </p:txBody>
+      </p:sp>
+      <p:cxnSp>
+        <p:nvCxnSpPr>
+          <p:cNvPr id="44" name="Elbow Connector 43"/>
+          <p:cNvCxnSpPr>
+            <a:stCxn id="8" idx="5"/>
+            <a:endCxn id="164" idx="0"/>
+          </p:cNvCxnSpPr>
+          <p:nvPr/>
+        </p:nvCxnSpPr>
+        <p:spPr>
+          <a:xfrm>
+            <a:off x="2731341" y="3660296"/>
+            <a:ext cx="351729" cy="311590"/>
+          </a:xfrm>
+          <a:prstGeom prst="bentConnector2">
+            <a:avLst/>
+          </a:prstGeom>
+          <a:ln>
+            <a:tailEnd type="arrow"/>
+          </a:ln>
+        </p:spPr>
+        <p:style>
+          <a:lnRef idx="2">
+            <a:schemeClr val="accent1"/>
+          </a:lnRef>
+          <a:fillRef idx="1">
+            <a:schemeClr val="lt1"/>
+          </a:fillRef>
+          <a:effectRef idx="0">
+            <a:schemeClr val="accent1"/>
+          </a:effectRef>
+          <a:fontRef idx="minor">
+            <a:schemeClr val="dk1"/>
+          </a:fontRef>
+        </p:style>
+      </p:cxnSp>
+      <p:cxnSp>
+        <p:nvCxnSpPr>
+          <p:cNvPr id="64" name="Straight Arrow Connector 63"/>
+          <p:cNvCxnSpPr/>
+          <p:nvPr/>
+        </p:nvCxnSpPr>
+        <p:spPr>
+          <a:xfrm>
+            <a:off x="6683818" y="2781116"/>
+            <a:ext cx="0" cy="280700"/>
+          </a:xfrm>
+          <a:prstGeom prst="straightConnector1">
+            <a:avLst/>
+          </a:prstGeom>
+          <a:ln>
+            <a:tailEnd type="arrow"/>
+          </a:ln>
+        </p:spPr>
+        <p:style>
+          <a:lnRef idx="2">
+            <a:schemeClr val="accent1"/>
+          </a:lnRef>
+          <a:fillRef idx="0">
+            <a:schemeClr val="accent1"/>
+          </a:fillRef>
+          <a:effectRef idx="1">
+            <a:schemeClr val="accent1"/>
+          </a:effectRef>
+          <a:fontRef idx="minor">
+            <a:schemeClr val="tx1"/>
+          </a:fontRef>
+        </p:style>
+      </p:cxnSp>
+      <p:cxnSp>
+        <p:nvCxnSpPr>
+          <p:cNvPr id="227" name="Straight Connector 226"/>
+          <p:cNvCxnSpPr/>
+          <p:nvPr/>
+        </p:nvCxnSpPr>
+        <p:spPr>
+          <a:xfrm>
+            <a:off x="0" y="3225800"/>
+            <a:ext cx="9144000" cy="0"/>
+          </a:xfrm>
+          <a:prstGeom prst="line">
+            <a:avLst/>
+          </a:prstGeom>
+          <a:ln>
+            <a:prstDash val="dash"/>
+          </a:ln>
+        </p:spPr>
+        <p:style>
+          <a:lnRef idx="2">
+            <a:schemeClr val="dk1"/>
+          </a:lnRef>
+          <a:fillRef idx="0">
+            <a:schemeClr val="dk1"/>
+          </a:fillRef>
+          <a:effectRef idx="1">
+            <a:schemeClr val="dk1"/>
+          </a:effectRef>
+          <a:fontRef idx="minor">
+            <a:schemeClr val="tx1"/>
+          </a:fontRef>
+        </p:style>
+      </p:cxnSp>
+      <p:sp>
+        <p:nvSpPr>
+          <p:cNvPr id="228" name="TextBox 227"/>
+          <p:cNvSpPr txBox="1"/>
+          <p:nvPr/>
+        </p:nvSpPr>
+        <p:spPr>
+          <a:xfrm>
+            <a:off x="22301" y="2508750"/>
+            <a:ext cx="1184199" cy="646331"/>
+          </a:xfrm>
+          <a:prstGeom prst="rect">
+            <a:avLst/>
+          </a:prstGeom>
+          <a:noFill/>
+        </p:spPr>
+        <p:txBody>
+          <a:bodyPr wrap="square" rtlCol="0">
+            <a:spAutoFit/>
+          </a:bodyPr>
+          <a:lstStyle/>
+          <a:p>
+            <a:r>
+              <a:rPr lang="en-US" dirty="0" smtClean="0"/>
+              <a:t>Probability </a:t>
+            </a:r>
+          </a:p>
+          <a:p>
+            <a:r>
+              <a:rPr lang="en-US" dirty="0" smtClean="0"/>
+              <a:t>estimation</a:t>
+            </a:r>
+            <a:endParaRPr lang="en-US" dirty="0"/>
+          </a:p>
+        </p:txBody>
+      </p:sp>
+      <p:sp>
+        <p:nvSpPr>
+          <p:cNvPr id="72" name="TextBox 71"/>
+          <p:cNvSpPr txBox="1"/>
+          <p:nvPr/>
+        </p:nvSpPr>
+        <p:spPr>
+          <a:xfrm>
+            <a:off x="22301" y="3290214"/>
+            <a:ext cx="1184199" cy="923330"/>
+          </a:xfrm>
+          <a:prstGeom prst="rect">
+            <a:avLst/>
+          </a:prstGeom>
+          <a:noFill/>
+        </p:spPr>
+        <p:txBody>
+          <a:bodyPr wrap="square" rtlCol="0">
+            <a:spAutoFit/>
+          </a:bodyPr>
+          <a:lstStyle/>
+          <a:p>
+            <a:r>
+              <a:rPr lang="en-US" dirty="0" smtClean="0"/>
+              <a:t>Best</a:t>
+            </a:r>
+          </a:p>
+          <a:p>
+            <a:r>
+              <a:rPr lang="en-US" dirty="0" smtClean="0"/>
+              <a:t>candidate</a:t>
+            </a:r>
+          </a:p>
+          <a:p>
+            <a:r>
+              <a:rPr lang="en-US" dirty="0" smtClean="0"/>
+              <a:t>selection</a:t>
+            </a:r>
           </a:p>
         </p:txBody>
       </p:sp>

</xml_diff>